<commit_message>
Busy with last document
</commit_message>
<xml_diff>
--- a/Z ITRI 671 Research/Presentation/ITRI671_Presentation.pptx
+++ b/Z ITRI 671 Research/Presentation/ITRI671_Presentation.pptx
@@ -5,10 +5,10 @@
     <p:sldMasterId id="2147483685" r:id="rId1"/>
   </p:sldMasterIdLst>
   <p:notesMasterIdLst>
-    <p:notesMasterId r:id="rId19"/>
+    <p:notesMasterId r:id="rId22"/>
   </p:notesMasterIdLst>
   <p:handoutMasterIdLst>
-    <p:handoutMasterId r:id="rId20"/>
+    <p:handoutMasterId r:id="rId23"/>
   </p:handoutMasterIdLst>
   <p:sldIdLst>
     <p:sldId id="258" r:id="rId2"/>
@@ -21,13 +21,16 @@
     <p:sldId id="266" r:id="rId9"/>
     <p:sldId id="265" r:id="rId10"/>
     <p:sldId id="272" r:id="rId11"/>
-    <p:sldId id="273" r:id="rId12"/>
-    <p:sldId id="274" r:id="rId13"/>
-    <p:sldId id="275" r:id="rId14"/>
-    <p:sldId id="276" r:id="rId15"/>
-    <p:sldId id="278" r:id="rId16"/>
-    <p:sldId id="277" r:id="rId17"/>
-    <p:sldId id="271" r:id="rId18"/>
+    <p:sldId id="279" r:id="rId12"/>
+    <p:sldId id="275" r:id="rId13"/>
+    <p:sldId id="276" r:id="rId14"/>
+    <p:sldId id="278" r:id="rId15"/>
+    <p:sldId id="277" r:id="rId16"/>
+    <p:sldId id="271" r:id="rId17"/>
+    <p:sldId id="281" r:id="rId18"/>
+    <p:sldId id="282" r:id="rId19"/>
+    <p:sldId id="280" r:id="rId20"/>
+    <p:sldId id="283" r:id="rId21"/>
   </p:sldIdLst>
   <p:sldSz cx="9144000" cy="5715000" type="screen16x10"/>
   <p:notesSz cx="6858000" cy="9144000"/>
@@ -285,7 +288,7 @@
           <a:p>
             <a:fld id="{8C027140-CBFB-714B-A4E1-023AD3D13926}" type="datetimeFigureOut">
               <a:rPr lang="en-US" smtClean="0"/>
-              <a:t>10/25/2021</a:t>
+              <a:t>10/26/2021</a:t>
             </a:fld>
             <a:endParaRPr lang="en-US"/>
           </a:p>
@@ -384,7 +387,7 @@
           <a:p>
             <a:fld id="{C696F781-C774-354D-A82E-25D0CDEA6942}" type="datetimeFigureOut">
               <a:rPr lang="en-US" smtClean="0"/>
-              <a:t>10/25/2021</a:t>
+              <a:t>10/26/2021</a:t>
             </a:fld>
             <a:endParaRPr lang="en-US"/>
           </a:p>
@@ -3137,6 +3140,11 @@
             </a:r>
           </a:p>
           <a:p>
+            <a:endParaRPr lang="en-ZA" sz="1600" dirty="0">
+              <a:latin typeface="Helvetica" pitchFamily="2" charset="0"/>
+            </a:endParaRPr>
+          </a:p>
+          <a:p>
             <a:r>
               <a:rPr lang="en-ZA" sz="1600" dirty="0">
                 <a:latin typeface="Helvetica" pitchFamily="2" charset="0"/>
@@ -3252,9 +3260,21 @@
               </a:rPr>
               <a:t>A project manager that has experience in the industry.</a:t>
             </a:r>
+          </a:p>
+          <a:p>
+            <a:pPr lvl="1"/>
             <a:endParaRPr lang="en-US" dirty="0">
               <a:latin typeface="Helvetica" pitchFamily="2" charset="0"/>
             </a:endParaRPr>
+          </a:p>
+          <a:p>
+            <a:pPr lvl="1"/>
+            <a:r>
+              <a:rPr lang="en-US" dirty="0">
+                <a:latin typeface="Helvetica" pitchFamily="2" charset="0"/>
+              </a:rPr>
+              <a:t>He was just as exited as I was.</a:t>
+            </a:r>
           </a:p>
         </p:txBody>
       </p:sp>
@@ -3427,6 +3447,23 @@
           </a:p>
           <a:p>
             <a:pPr lvl="1"/>
+            <a:r>
+              <a:rPr lang="en-US" dirty="0">
+                <a:latin typeface="Helvetica" pitchFamily="2" charset="0"/>
+              </a:rPr>
+              <a:t>Conversation about features that would help them out.</a:t>
+            </a:r>
+          </a:p>
+          <a:p>
+            <a:pPr marL="342900" lvl="1" indent="0">
+              <a:buNone/>
+            </a:pPr>
+            <a:endParaRPr lang="en-US" dirty="0">
+              <a:latin typeface="Helvetica" pitchFamily="2" charset="0"/>
+            </a:endParaRPr>
+          </a:p>
+          <a:p>
+            <a:pPr lvl="1"/>
             <a:endParaRPr lang="en-US" dirty="0">
               <a:latin typeface="Helvetica" pitchFamily="2" charset="0"/>
             </a:endParaRPr>
@@ -3475,7 +3512,7 @@
     </p:spTree>
     <p:extLst>
       <p:ext uri="{BB962C8B-B14F-4D97-AF65-F5344CB8AC3E}">
-        <p14:creationId xmlns:p14="http://schemas.microsoft.com/office/powerpoint/2010/main" val="482506845"/>
+        <p14:creationId xmlns:p14="http://schemas.microsoft.com/office/powerpoint/2010/main" val="3685902319"/>
       </p:ext>
     </p:extLst>
   </p:cSld>
@@ -3546,20 +3583,40 @@
           <a:bodyPr/>
           <a:lstStyle/>
           <a:p>
+            <a:pPr lvl="1"/>
+            <a:r>
+              <a:rPr lang="en-US" sz="2000" dirty="0">
+                <a:latin typeface="Helvetica" pitchFamily="2" charset="0"/>
+              </a:rPr>
+              <a:t>Used open coding as analysis </a:t>
+            </a:r>
+            <a:r>
+              <a:rPr lang="en-ZA" sz="2000" b="0" i="0" dirty="0">
+                <a:solidFill>
+                  <a:srgbClr val="111111"/>
+                </a:solidFill>
+                <a:effectLst/>
+                <a:latin typeface="Roboto" panose="02000000000000000000" pitchFamily="2" charset="0"/>
+              </a:rPr>
+              <a:t>technique.</a:t>
+            </a:r>
+            <a:r>
+              <a:rPr lang="en-US" sz="2000" dirty="0">
+                <a:latin typeface="Helvetica" pitchFamily="2" charset="0"/>
+              </a:rPr>
+              <a:t> </a:t>
+            </a:r>
+            <a:endParaRPr lang="en-US" sz="2000" dirty="0">
+              <a:latin typeface="Helvetica" panose="020B0604020202020204" pitchFamily="34" charset="0"/>
+              <a:cs typeface="Helvetica" panose="020B0604020202020204" pitchFamily="34" charset="0"/>
+            </a:endParaRPr>
+          </a:p>
+          <a:p>
             <a:pPr marL="342900" lvl="1" indent="0">
               <a:buNone/>
             </a:pPr>
-            <a:r>
-              <a:rPr lang="en-US" sz="2000" dirty="0">
-                <a:latin typeface="Helvetica" pitchFamily="2" charset="0"/>
-              </a:rPr>
-              <a:t>Line-by-line analysis:</a:t>
-            </a:r>
-          </a:p>
-          <a:p>
-            <a:pPr lvl="1"/>
             <a:endParaRPr lang="en-US" sz="2000" dirty="0">
-              <a:latin typeface="Helvetica" pitchFamily="2" charset="0"/>
+              <a:latin typeface="Helvetica" panose="020B0604020202020204" pitchFamily="34" charset="0"/>
               <a:cs typeface="Helvetica" panose="020B0604020202020204" pitchFamily="34" charset="0"/>
             </a:endParaRPr>
           </a:p>
@@ -3572,14 +3629,86 @@
                 <a:latin typeface="Helvetica" panose="020B0604020202020204" pitchFamily="34" charset="0"/>
                 <a:cs typeface="Helvetica" panose="020B0604020202020204" pitchFamily="34" charset="0"/>
               </a:rPr>
-              <a:t>Open coding is the qualitative data analysis technique for creating categories that order data according to their similarities and differences.</a:t>
-            </a:r>
-          </a:p>
-          <a:p>
-            <a:pPr lvl="1"/>
-            <a:endParaRPr lang="en-US" dirty="0">
-              <a:latin typeface="Helvetica" pitchFamily="2" charset="0"/>
+              <a:t>Common requirements and specifications:</a:t>
+            </a:r>
+          </a:p>
+          <a:p>
+            <a:pPr marL="342900" lvl="1" indent="0">
+              <a:buNone/>
+            </a:pPr>
+            <a:endParaRPr lang="en-US" sz="2000" dirty="0">
+              <a:latin typeface="Helvetica" panose="020B0604020202020204" pitchFamily="34" charset="0"/>
+              <a:cs typeface="Helvetica" panose="020B0604020202020204" pitchFamily="34" charset="0"/>
             </a:endParaRPr>
+          </a:p>
+          <a:p>
+            <a:pPr marL="800100" lvl="1" indent="-457200">
+              <a:buFont typeface="+mj-lt"/>
+              <a:buAutoNum type="arabicPeriod"/>
+            </a:pPr>
+            <a:r>
+              <a:rPr lang="en-US" sz="2000" dirty="0">
+                <a:latin typeface="Helvetica" panose="020B0604020202020204" pitchFamily="34" charset="0"/>
+                <a:cs typeface="Helvetica" panose="020B0604020202020204" pitchFamily="34" charset="0"/>
+              </a:rPr>
+              <a:t>Easy Communication method</a:t>
+            </a:r>
+          </a:p>
+          <a:p>
+            <a:pPr marL="800100" lvl="1" indent="-457200">
+              <a:buFont typeface="+mj-lt"/>
+              <a:buAutoNum type="arabicPeriod"/>
+            </a:pPr>
+            <a:r>
+              <a:rPr lang="en-US" sz="2000" dirty="0">
+                <a:latin typeface="Helvetica" panose="020B0604020202020204" pitchFamily="34" charset="0"/>
+                <a:cs typeface="Helvetica" panose="020B0604020202020204" pitchFamily="34" charset="0"/>
+              </a:rPr>
+              <a:t>Improve Productivity</a:t>
+            </a:r>
+          </a:p>
+          <a:p>
+            <a:pPr marL="800100" lvl="1" indent="-457200">
+              <a:buFont typeface="+mj-lt"/>
+              <a:buAutoNum type="arabicPeriod"/>
+            </a:pPr>
+            <a:r>
+              <a:rPr lang="en-US" sz="2000" dirty="0">
+                <a:latin typeface="Helvetica" panose="020B0604020202020204" pitchFamily="34" charset="0"/>
+                <a:cs typeface="Helvetica" panose="020B0604020202020204" pitchFamily="34" charset="0"/>
+              </a:rPr>
+              <a:t>Artefact should focus on communication between employees and about their project.</a:t>
+            </a:r>
+          </a:p>
+          <a:p>
+            <a:pPr marL="800100" lvl="1" indent="-457200">
+              <a:buFont typeface="+mj-lt"/>
+              <a:buAutoNum type="arabicPeriod"/>
+            </a:pPr>
+            <a:r>
+              <a:rPr lang="en-ZA" sz="2000" dirty="0">
+                <a:latin typeface="Helvetica" panose="020B0604020202020204" pitchFamily="34" charset="0"/>
+                <a:cs typeface="Helvetica" panose="020B0604020202020204" pitchFamily="34" charset="0"/>
+              </a:rPr>
+              <a:t>Create a relaxed environment.</a:t>
+            </a:r>
+            <a:endParaRPr lang="en-US" sz="2000" dirty="0">
+              <a:latin typeface="Helvetica" panose="020B0604020202020204" pitchFamily="34" charset="0"/>
+              <a:cs typeface="Helvetica" panose="020B0604020202020204" pitchFamily="34" charset="0"/>
+            </a:endParaRPr>
+          </a:p>
+          <a:p>
+            <a:pPr marL="800100" lvl="1" indent="-457200">
+              <a:buFont typeface="+mj-lt"/>
+              <a:buAutoNum type="arabicPeriod"/>
+            </a:pPr>
+            <a:r>
+              <a:rPr lang="en-US" sz="2000" dirty="0">
+                <a:latin typeface="Helvetica" panose="020B0604020202020204" pitchFamily="34" charset="0"/>
+                <a:cs typeface="Helvetica" panose="020B0604020202020204" pitchFamily="34" charset="0"/>
+              </a:rPr>
+              <a:t>The user experience comes first.</a:t>
+            </a:r>
           </a:p>
           <a:p>
             <a:pPr lvl="1"/>
@@ -3631,7 +3760,7 @@
     </p:spTree>
     <p:extLst>
       <p:ext uri="{BB962C8B-B14F-4D97-AF65-F5344CB8AC3E}">
-        <p14:creationId xmlns:p14="http://schemas.microsoft.com/office/powerpoint/2010/main" val="3118106429"/>
+        <p14:creationId xmlns:p14="http://schemas.microsoft.com/office/powerpoint/2010/main" val="1654329177"/>
       </p:ext>
     </p:extLst>
   </p:cSld>
@@ -3677,7 +3806,7 @@
               <a:rPr lang="en-US" dirty="0">
                 <a:latin typeface="Helvetica" pitchFamily="2" charset="0"/>
               </a:rPr>
-              <a:t>Data analysis (cont.)</a:t>
+              <a:t>Findings</a:t>
             </a:r>
           </a:p>
         </p:txBody>
@@ -3694,7 +3823,7 @@
         </p:nvSpPr>
         <p:spPr>
           <a:xfrm>
-            <a:off x="628650" y="1354412"/>
+            <a:off x="313857" y="1756938"/>
             <a:ext cx="7886700" cy="3793057"/>
           </a:xfrm>
         </p:spPr>
@@ -3702,93 +3831,61 @@
           <a:bodyPr/>
           <a:lstStyle/>
           <a:p>
-            <a:pPr marL="342900" lvl="1" indent="0">
-              <a:buNone/>
-            </a:pPr>
+            <a:pPr lvl="1"/>
             <a:r>
               <a:rPr lang="en-US" sz="2000" dirty="0">
                 <a:latin typeface="Helvetica" panose="020B0604020202020204" pitchFamily="34" charset="0"/>
                 <a:cs typeface="Helvetica" panose="020B0604020202020204" pitchFamily="34" charset="0"/>
               </a:rPr>
-              <a:t>Common requirements and specifications:</a:t>
-            </a:r>
-          </a:p>
-          <a:p>
-            <a:pPr marL="342900" lvl="1" indent="0">
+              <a:t>Easy Communication method</a:t>
+            </a:r>
+            <a:r>
+              <a:rPr lang="en-US" sz="2000" dirty="0">
+                <a:latin typeface="Helvetica" pitchFamily="2" charset="0"/>
+              </a:rPr>
+              <a:t>:</a:t>
+            </a:r>
+          </a:p>
+          <a:p>
+            <a:pPr lvl="2"/>
+            <a:r>
+              <a:rPr lang="en-US" dirty="0">
+                <a:latin typeface="Helvetica" pitchFamily="2" charset="0"/>
+              </a:rPr>
+              <a:t>Combining different communication methods: For the Artefact communication methods that was focused on was instant messages and Issue queues.</a:t>
+            </a:r>
+          </a:p>
+          <a:p>
+            <a:pPr marL="685800" lvl="2" indent="0">
               <a:buNone/>
             </a:pPr>
-            <a:endParaRPr lang="en-US" sz="2000" dirty="0">
-              <a:latin typeface="Helvetica" panose="020B0604020202020204" pitchFamily="34" charset="0"/>
-              <a:cs typeface="Helvetica" panose="020B0604020202020204" pitchFamily="34" charset="0"/>
+            <a:endParaRPr lang="en-US" dirty="0">
+              <a:latin typeface="Helvetica" pitchFamily="2" charset="0"/>
             </a:endParaRPr>
           </a:p>
           <a:p>
-            <a:pPr marL="800100" lvl="1" indent="-457200">
-              <a:buFont typeface="+mj-lt"/>
-              <a:buAutoNum type="arabicPeriod"/>
-            </a:pPr>
+            <a:pPr lvl="1"/>
             <a:r>
               <a:rPr lang="en-US" sz="2000" dirty="0">
                 <a:latin typeface="Helvetica" panose="020B0604020202020204" pitchFamily="34" charset="0"/>
                 <a:cs typeface="Helvetica" panose="020B0604020202020204" pitchFamily="34" charset="0"/>
               </a:rPr>
-              <a:t>Easy Communication method</a:t>
-            </a:r>
-          </a:p>
-          <a:p>
-            <a:pPr marL="800100" lvl="1" indent="-457200">
-              <a:buFont typeface="+mj-lt"/>
-              <a:buAutoNum type="arabicPeriod"/>
-            </a:pPr>
+              <a:t>Improve Productivity</a:t>
+            </a:r>
             <a:r>
               <a:rPr lang="en-US" sz="2000" dirty="0">
-                <a:latin typeface="Helvetica" panose="020B0604020202020204" pitchFamily="34" charset="0"/>
-                <a:cs typeface="Helvetica" panose="020B0604020202020204" pitchFamily="34" charset="0"/>
-              </a:rPr>
-              <a:t>Improve Productivity</a:t>
-            </a:r>
-          </a:p>
-          <a:p>
-            <a:pPr marL="800100" lvl="1" indent="-457200">
-              <a:buFont typeface="+mj-lt"/>
-              <a:buAutoNum type="arabicPeriod"/>
-            </a:pPr>
-            <a:r>
-              <a:rPr lang="en-US" sz="2000" dirty="0">
-                <a:latin typeface="Helvetica" panose="020B0604020202020204" pitchFamily="34" charset="0"/>
-                <a:cs typeface="Helvetica" panose="020B0604020202020204" pitchFamily="34" charset="0"/>
-              </a:rPr>
-              <a:t>Artefact should focus on communication between employees and about their project.</a:t>
-            </a:r>
-          </a:p>
-          <a:p>
-            <a:pPr marL="800100" lvl="1" indent="-457200">
-              <a:buFont typeface="+mj-lt"/>
-              <a:buAutoNum type="arabicPeriod"/>
-            </a:pPr>
-            <a:r>
-              <a:rPr lang="en-ZA" sz="2000" dirty="0">
-                <a:latin typeface="Helvetica" panose="020B0604020202020204" pitchFamily="34" charset="0"/>
-                <a:cs typeface="Helvetica" panose="020B0604020202020204" pitchFamily="34" charset="0"/>
-              </a:rPr>
-              <a:t>Create a relaxed environment.</a:t>
-            </a:r>
-            <a:endParaRPr lang="en-US" sz="2000" dirty="0">
-              <a:latin typeface="Helvetica" panose="020B0604020202020204" pitchFamily="34" charset="0"/>
-              <a:cs typeface="Helvetica" panose="020B0604020202020204" pitchFamily="34" charset="0"/>
-            </a:endParaRPr>
-          </a:p>
-          <a:p>
-            <a:pPr marL="800100" lvl="1" indent="-457200">
-              <a:buFont typeface="+mj-lt"/>
-              <a:buAutoNum type="arabicPeriod"/>
-            </a:pPr>
-            <a:r>
-              <a:rPr lang="en-US" sz="2000" dirty="0">
-                <a:latin typeface="Helvetica" panose="020B0604020202020204" pitchFamily="34" charset="0"/>
-                <a:cs typeface="Helvetica" panose="020B0604020202020204" pitchFamily="34" charset="0"/>
-              </a:rPr>
-              <a:t>The user experience comes first.</a:t>
+                <a:latin typeface="Helvetica" pitchFamily="2" charset="0"/>
+              </a:rPr>
+              <a:t>: </a:t>
+            </a:r>
+          </a:p>
+          <a:p>
+            <a:pPr lvl="2"/>
+            <a:r>
+              <a:rPr lang="en-US" dirty="0">
+                <a:latin typeface="Helvetica" pitchFamily="2" charset="0"/>
+              </a:rPr>
+              <a:t>Project overview, a member of a team will be able to see an overview of their team. Users are always aware of what they whole team is busy with.</a:t>
             </a:r>
           </a:p>
           <a:p>
@@ -3841,7 +3938,7 @@
     </p:spTree>
     <p:extLst>
       <p:ext uri="{BB962C8B-B14F-4D97-AF65-F5344CB8AC3E}">
-        <p14:creationId xmlns:p14="http://schemas.microsoft.com/office/powerpoint/2010/main" val="1654329177"/>
+        <p14:creationId xmlns:p14="http://schemas.microsoft.com/office/powerpoint/2010/main" val="3600194974"/>
       </p:ext>
     </p:extLst>
   </p:cSld>
@@ -3887,8 +3984,17 @@
               <a:rPr lang="en-US" dirty="0">
                 <a:latin typeface="Helvetica" pitchFamily="2" charset="0"/>
               </a:rPr>
-              <a:t>Findings</a:t>
-            </a:r>
+              <a:t>Findings </a:t>
+            </a:r>
+            <a:r>
+              <a:rPr lang="en-US" i="1" dirty="0">
+                <a:latin typeface="Helvetica" pitchFamily="2" charset="0"/>
+              </a:rPr>
+              <a:t>(cont.)</a:t>
+            </a:r>
+            <a:endParaRPr lang="en-US" dirty="0">
+              <a:latin typeface="Helvetica" pitchFamily="2" charset="0"/>
+            </a:endParaRPr>
           </a:p>
         </p:txBody>
       </p:sp>
@@ -3904,7 +4010,7 @@
         </p:nvSpPr>
         <p:spPr>
           <a:xfrm>
-            <a:off x="313857" y="1756938"/>
+            <a:off x="231412" y="1404501"/>
             <a:ext cx="7886700" cy="3793057"/>
           </a:xfrm>
         </p:spPr>
@@ -3912,13 +4018,15 @@
           <a:bodyPr/>
           <a:lstStyle/>
           <a:p>
-            <a:pPr lvl="1"/>
+            <a:pPr marL="342900" lvl="1" indent="0">
+              <a:buNone/>
+            </a:pPr>
             <a:r>
               <a:rPr lang="en-US" sz="2000" dirty="0">
                 <a:latin typeface="Helvetica" panose="020B0604020202020204" pitchFamily="34" charset="0"/>
                 <a:cs typeface="Helvetica" panose="020B0604020202020204" pitchFamily="34" charset="0"/>
               </a:rPr>
-              <a:t>Easy Communication method</a:t>
+              <a:t>Artefact should focus on communication between employees and about their project</a:t>
             </a:r>
             <a:r>
               <a:rPr lang="en-US" sz="2000" dirty="0">
@@ -3933,7 +4041,16 @@
               <a:rPr lang="en-US" dirty="0">
                 <a:latin typeface="Helvetica" pitchFamily="2" charset="0"/>
               </a:rPr>
-              <a:t>Combining different communication methods: For the Artefact communication methods that was focused on was instant messages and Issue queues. A new “Chat” feature was developed as well as a “To Do” feature.</a:t>
+              <a:t>In this artefact, an “Activities” feature was added. The Activities feature provides information on the backlog of the project. </a:t>
+            </a:r>
+          </a:p>
+          <a:p>
+            <a:pPr lvl="2"/>
+            <a:r>
+              <a:rPr lang="en-US" dirty="0">
+                <a:latin typeface="Helvetica" pitchFamily="2" charset="0"/>
+              </a:rPr>
+              <a:t>An Analytics page was added to give important information on the project.</a:t>
             </a:r>
           </a:p>
           <a:p>
@@ -3943,13 +4060,15 @@
             </a:endParaRPr>
           </a:p>
           <a:p>
-            <a:pPr lvl="1"/>
+            <a:pPr marL="342900" lvl="1" indent="0">
+              <a:buNone/>
+            </a:pPr>
             <a:r>
               <a:rPr lang="en-US" sz="2000" dirty="0">
                 <a:latin typeface="Helvetica" panose="020B0604020202020204" pitchFamily="34" charset="0"/>
                 <a:cs typeface="Helvetica" panose="020B0604020202020204" pitchFamily="34" charset="0"/>
               </a:rPr>
-              <a:t>Improve Productivity</a:t>
+              <a:t>Create a relaxed environment</a:t>
             </a:r>
             <a:r>
               <a:rPr lang="en-US" sz="2000" dirty="0">
@@ -3961,14 +4080,48 @@
           <a:p>
             <a:pPr lvl="2"/>
             <a:r>
-              <a:rPr lang="en-US" dirty="0">
-                <a:latin typeface="Helvetica" pitchFamily="2" charset="0"/>
-              </a:rPr>
-              <a:t>Project overview, a member of a team will be able to see an overview of their team under a feature named “My Team”. This feature satisfied the need for improving productivity as a team, as they are always aware of what they whole team is busy with.</a:t>
-            </a:r>
-          </a:p>
-          <a:p>
-            <a:pPr lvl="1"/>
+              <a:rPr lang="en-US" dirty="0"/>
+              <a:t>A calendar feature was developed for the artefact. This creates a more flexible way of planning the project and everyone in the team can contribute to events.</a:t>
+            </a:r>
+            <a:endParaRPr lang="en-US" dirty="0">
+              <a:latin typeface="Helvetica" pitchFamily="2" charset="0"/>
+            </a:endParaRPr>
+          </a:p>
+          <a:p>
+            <a:pPr lvl="2"/>
+            <a:endParaRPr lang="en-US" dirty="0">
+              <a:latin typeface="Helvetica" pitchFamily="2" charset="0"/>
+            </a:endParaRPr>
+          </a:p>
+          <a:p>
+            <a:pPr marL="342900" lvl="1" indent="0">
+              <a:buNone/>
+            </a:pPr>
+            <a:r>
+              <a:rPr lang="en-US" sz="2000" dirty="0"/>
+              <a:t>The user experience comes first</a:t>
+            </a:r>
+            <a:r>
+              <a:rPr lang="en-US" sz="2000" dirty="0">
+                <a:latin typeface="Helvetica" pitchFamily="2" charset="0"/>
+              </a:rPr>
+              <a:t>:</a:t>
+            </a:r>
+          </a:p>
+          <a:p>
+            <a:pPr lvl="2"/>
+            <a:r>
+              <a:rPr lang="en-US" dirty="0"/>
+              <a:t>By using pre-emptive dialog, users will make minimal errors when working with the artefact. For example, putting each feature in its own tab.</a:t>
+            </a:r>
+            <a:endParaRPr lang="en-US" dirty="0">
+              <a:latin typeface="Helvetica" pitchFamily="2" charset="0"/>
+            </a:endParaRPr>
+          </a:p>
+          <a:p>
+            <a:pPr marL="685800" lvl="2" indent="0">
+              <a:buNone/>
+            </a:pPr>
             <a:endParaRPr lang="en-US" dirty="0">
               <a:latin typeface="Helvetica" pitchFamily="2" charset="0"/>
             </a:endParaRPr>
@@ -4017,7 +4170,7 @@
     </p:spTree>
     <p:extLst>
       <p:ext uri="{BB962C8B-B14F-4D97-AF65-F5344CB8AC3E}">
-        <p14:creationId xmlns:p14="http://schemas.microsoft.com/office/powerpoint/2010/main" val="3600194974"/>
+        <p14:creationId xmlns:p14="http://schemas.microsoft.com/office/powerpoint/2010/main" val="1832921880"/>
       </p:ext>
     </p:extLst>
   </p:cSld>
@@ -4063,17 +4216,8 @@
               <a:rPr lang="en-US" dirty="0">
                 <a:latin typeface="Helvetica" pitchFamily="2" charset="0"/>
               </a:rPr>
-              <a:t>Findings </a:t>
-            </a:r>
-            <a:r>
-              <a:rPr lang="en-US" i="1" dirty="0">
-                <a:latin typeface="Helvetica" pitchFamily="2" charset="0"/>
-              </a:rPr>
-              <a:t>(cont.)</a:t>
-            </a:r>
-            <a:endParaRPr lang="en-US" dirty="0">
-              <a:latin typeface="Helvetica" pitchFamily="2" charset="0"/>
-            </a:endParaRPr>
+              <a:t>Limitations and future research</a:t>
+            </a:r>
           </a:p>
         </p:txBody>
       </p:sp>
@@ -4089,7 +4233,7 @@
         </p:nvSpPr>
         <p:spPr>
           <a:xfrm>
-            <a:off x="231412" y="1404501"/>
+            <a:off x="628650" y="1354412"/>
             <a:ext cx="7886700" cy="3793057"/>
           </a:xfrm>
         </p:spPr>
@@ -4097,21 +4241,12 @@
           <a:bodyPr/>
           <a:lstStyle/>
           <a:p>
-            <a:pPr marL="342900" lvl="1" indent="0">
-              <a:buNone/>
-            </a:pPr>
-            <a:r>
-              <a:rPr lang="en-US" sz="2000" dirty="0">
-                <a:latin typeface="Helvetica" panose="020B0604020202020204" pitchFamily="34" charset="0"/>
-                <a:cs typeface="Helvetica" panose="020B0604020202020204" pitchFamily="34" charset="0"/>
-              </a:rPr>
-              <a:t>Artefact should focus on communication between employees and about their project</a:t>
-            </a:r>
-            <a:r>
-              <a:rPr lang="en-US" sz="2000" dirty="0">
-                <a:latin typeface="Helvetica" pitchFamily="2" charset="0"/>
-              </a:rPr>
-              <a:t>:</a:t>
+            <a:pPr lvl="1"/>
+            <a:r>
+              <a:rPr lang="en-US" dirty="0">
+                <a:latin typeface="Helvetica" pitchFamily="2" charset="0"/>
+              </a:rPr>
+              <a:t>Limitations:</a:t>
             </a:r>
           </a:p>
           <a:p>
@@ -4120,7 +4255,7 @@
               <a:rPr lang="en-US" dirty="0">
                 <a:latin typeface="Helvetica" pitchFamily="2" charset="0"/>
               </a:rPr>
-              <a:t>In this artefact, an “Activities” feature was added. The Activities feature provides information on the backlog of the project. </a:t>
+              <a:t>More participants</a:t>
             </a:r>
           </a:p>
           <a:p>
@@ -4129,73 +4264,8 @@
               <a:rPr lang="en-US" dirty="0">
                 <a:latin typeface="Helvetica" pitchFamily="2" charset="0"/>
               </a:rPr>
-              <a:t>An Analytics page was added to give important information on the project.</a:t>
-            </a:r>
-          </a:p>
-          <a:p>
-            <a:pPr lvl="2"/>
-            <a:endParaRPr lang="en-US" dirty="0">
-              <a:latin typeface="Helvetica" pitchFamily="2" charset="0"/>
-            </a:endParaRPr>
-          </a:p>
-          <a:p>
-            <a:pPr marL="342900" lvl="1" indent="0">
-              <a:buNone/>
-            </a:pPr>
-            <a:r>
-              <a:rPr lang="en-US" sz="2000" dirty="0">
-                <a:latin typeface="Helvetica" panose="020B0604020202020204" pitchFamily="34" charset="0"/>
-                <a:cs typeface="Helvetica" panose="020B0604020202020204" pitchFamily="34" charset="0"/>
-              </a:rPr>
-              <a:t>Create a relaxed environment</a:t>
-            </a:r>
-            <a:r>
-              <a:rPr lang="en-US" sz="2000" dirty="0">
-                <a:latin typeface="Helvetica" pitchFamily="2" charset="0"/>
-              </a:rPr>
-              <a:t>: </a:t>
-            </a:r>
-          </a:p>
-          <a:p>
-            <a:pPr lvl="2"/>
-            <a:r>
-              <a:rPr lang="en-US" dirty="0"/>
-              <a:t>A new calendar feature was developed for the artefact. This creates a more flexible way of planning the project and everyone in the team can contribute to events.</a:t>
-            </a:r>
-            <a:endParaRPr lang="en-US" dirty="0">
-              <a:latin typeface="Helvetica" pitchFamily="2" charset="0"/>
-            </a:endParaRPr>
-          </a:p>
-          <a:p>
-            <a:pPr lvl="2"/>
-            <a:endParaRPr lang="en-US" dirty="0">
-              <a:latin typeface="Helvetica" pitchFamily="2" charset="0"/>
-            </a:endParaRPr>
-          </a:p>
-          <a:p>
-            <a:pPr marL="342900" lvl="1" indent="0">
-              <a:buNone/>
-            </a:pPr>
-            <a:r>
-              <a:rPr lang="en-US" sz="2000" dirty="0"/>
-              <a:t>The user experience comes first</a:t>
-            </a:r>
-            <a:r>
-              <a:rPr lang="en-US" sz="2000" dirty="0">
-                <a:latin typeface="Helvetica" pitchFamily="2" charset="0"/>
-              </a:rPr>
-              <a:t>:</a:t>
-            </a:r>
-          </a:p>
-          <a:p>
-            <a:pPr lvl="2"/>
-            <a:r>
-              <a:rPr lang="en-US" dirty="0"/>
-              <a:t>By using pre-emptive dialog, users will make minimal errors when working with the artefact. For example, the user can only direct input to a single selected window, putting each feature in its own tab.</a:t>
-            </a:r>
-            <a:endParaRPr lang="en-US" dirty="0">
-              <a:latin typeface="Helvetica" pitchFamily="2" charset="0"/>
-            </a:endParaRPr>
+              <a:t>More interviews</a:t>
+            </a:r>
           </a:p>
           <a:p>
             <a:pPr marL="685800" lvl="2" indent="0">
@@ -4204,6 +4274,45 @@
             <a:endParaRPr lang="en-US" dirty="0">
               <a:latin typeface="Helvetica" pitchFamily="2" charset="0"/>
             </a:endParaRPr>
+          </a:p>
+          <a:p>
+            <a:pPr lvl="1"/>
+            <a:r>
+              <a:rPr lang="en-US" dirty="0">
+                <a:latin typeface="Helvetica" pitchFamily="2" charset="0"/>
+              </a:rPr>
+              <a:t>Future research:</a:t>
+            </a:r>
+          </a:p>
+          <a:p>
+            <a:pPr lvl="2"/>
+            <a:r>
+              <a:rPr lang="en-US" dirty="0">
+                <a:latin typeface="Helvetica" pitchFamily="2" charset="0"/>
+              </a:rPr>
+              <a:t>More Features</a:t>
+            </a:r>
+          </a:p>
+          <a:p>
+            <a:pPr lvl="2"/>
+            <a:r>
+              <a:rPr lang="en-US" dirty="0">
+                <a:latin typeface="Helvetica" pitchFamily="2" charset="0"/>
+              </a:rPr>
+              <a:t>Full system and not limited to </a:t>
+            </a:r>
+            <a:r>
+              <a:rPr lang="en-US" dirty="0" err="1">
+                <a:latin typeface="Helvetica" pitchFamily="2" charset="0"/>
+              </a:rPr>
+              <a:t>Honours</a:t>
+            </a:r>
+            <a:r>
+              <a:rPr lang="en-US" dirty="0">
+                <a:latin typeface="Helvetica" pitchFamily="2" charset="0"/>
+              </a:rPr>
+              <a:t> degree scope.</a:t>
+            </a:r>
           </a:p>
         </p:txBody>
       </p:sp>
@@ -4249,7 +4358,7 @@
     </p:spTree>
     <p:extLst>
       <p:ext uri="{BB962C8B-B14F-4D97-AF65-F5344CB8AC3E}">
-        <p14:creationId xmlns:p14="http://schemas.microsoft.com/office/powerpoint/2010/main" val="1832921880"/>
+        <p14:creationId xmlns:p14="http://schemas.microsoft.com/office/powerpoint/2010/main" val="1626972229"/>
       </p:ext>
     </p:extLst>
   </p:cSld>
@@ -4286,109 +4395,50 @@
             <p:ph type="title"/>
           </p:nvPr>
         </p:nvSpPr>
-        <p:spPr/>
-        <p:txBody>
-          <a:bodyPr/>
-          <a:lstStyle/>
-          <a:p>
-            <a:r>
-              <a:rPr lang="en-US" dirty="0">
-                <a:latin typeface="Helvetica" pitchFamily="2" charset="0"/>
-              </a:rPr>
-              <a:t>Limitations and future research</a:t>
-            </a:r>
-          </a:p>
-        </p:txBody>
-      </p:sp>
-      <p:sp>
-        <p:nvSpPr>
-          <p:cNvPr id="3" name="Content Placeholder 2"/>
-          <p:cNvSpPr>
-            <a:spLocks noGrp="1"/>
-          </p:cNvSpPr>
-          <p:nvPr>
-            <p:ph idx="1"/>
-          </p:nvPr>
-        </p:nvSpPr>
-        <p:spPr>
-          <a:xfrm>
-            <a:off x="628650" y="1354412"/>
-            <a:ext cx="7886700" cy="3793057"/>
-          </a:xfrm>
-        </p:spPr>
-        <p:txBody>
-          <a:bodyPr/>
-          <a:lstStyle/>
-          <a:p>
-            <a:pPr lvl="1"/>
-            <a:r>
-              <a:rPr lang="en-US" dirty="0">
-                <a:latin typeface="Helvetica" pitchFamily="2" charset="0"/>
-              </a:rPr>
-              <a:t>Limitations:</a:t>
-            </a:r>
-          </a:p>
-          <a:p>
-            <a:pPr lvl="2"/>
-            <a:r>
-              <a:rPr lang="en-US" dirty="0">
-                <a:latin typeface="Helvetica" pitchFamily="2" charset="0"/>
-              </a:rPr>
-              <a:t>Participants</a:t>
-            </a:r>
-          </a:p>
-          <a:p>
-            <a:pPr lvl="2"/>
-            <a:r>
-              <a:rPr lang="en-US" dirty="0">
-                <a:latin typeface="Helvetica" pitchFamily="2" charset="0"/>
-              </a:rPr>
-              <a:t>Interviews</a:t>
-            </a:r>
-          </a:p>
-          <a:p>
-            <a:pPr marL="685800" lvl="2" indent="0">
-              <a:buNone/>
-            </a:pPr>
-            <a:endParaRPr lang="en-US" dirty="0">
-              <a:latin typeface="Helvetica" pitchFamily="2" charset="0"/>
-            </a:endParaRPr>
-          </a:p>
-          <a:p>
-            <a:pPr lvl="1"/>
-            <a:r>
-              <a:rPr lang="en-US" dirty="0">
-                <a:latin typeface="Helvetica" pitchFamily="2" charset="0"/>
-              </a:rPr>
-              <a:t>Future research:</a:t>
-            </a:r>
-          </a:p>
-          <a:p>
-            <a:pPr lvl="2"/>
-            <a:r>
-              <a:rPr lang="en-US" dirty="0">
-                <a:latin typeface="Helvetica" pitchFamily="2" charset="0"/>
-              </a:rPr>
-              <a:t>More Features</a:t>
-            </a:r>
-          </a:p>
-          <a:p>
-            <a:pPr lvl="2"/>
-            <a:r>
-              <a:rPr lang="en-US" dirty="0">
-                <a:latin typeface="Helvetica" pitchFamily="2" charset="0"/>
-              </a:rPr>
-              <a:t>Full system and not a demo</a:t>
-            </a:r>
-          </a:p>
-        </p:txBody>
-      </p:sp>
-      <p:sp>
-        <p:nvSpPr>
-          <p:cNvPr id="5" name="TextBox 4">
+        <p:spPr>
+          <a:xfrm>
+            <a:off x="628650" y="304271"/>
+            <a:ext cx="7886700" cy="4838370"/>
+          </a:xfrm>
+        </p:spPr>
+        <p:txBody>
+          <a:bodyPr>
+            <a:normAutofit/>
+          </a:bodyPr>
+          <a:lstStyle/>
+          <a:p>
+            <a:pPr algn="ctr"/>
+            <a:r>
+              <a:rPr lang="en-US" sz="7200" b="1" dirty="0">
+                <a:latin typeface="Helvetica" pitchFamily="2" charset="0"/>
+              </a:rPr>
+              <a:t>Thank you!</a:t>
+            </a:r>
+            <a:br>
+              <a:rPr lang="en-US" sz="7200" b="1" dirty="0">
+                <a:latin typeface="Helvetica" pitchFamily="2" charset="0"/>
+              </a:rPr>
+            </a:br>
+            <a:br>
+              <a:rPr lang="en-US" sz="7200" b="1" dirty="0">
+                <a:latin typeface="Helvetica" pitchFamily="2" charset="0"/>
+              </a:rPr>
+            </a:br>
+            <a:r>
+              <a:rPr lang="en-US" sz="2800" b="1" dirty="0">
+                <a:latin typeface="Helvetica" pitchFamily="2" charset="0"/>
+              </a:rPr>
+              <a:t>Any questions before I show the artefact?</a:t>
+            </a:r>
+          </a:p>
+        </p:txBody>
+      </p:sp>
+      <p:sp>
+        <p:nvSpPr>
+          <p:cNvPr id="3" name="TextBox 2">
             <a:extLst>
               <a:ext uri="{FF2B5EF4-FFF2-40B4-BE49-F238E27FC236}">
-                <a16:creationId xmlns:a16="http://schemas.microsoft.com/office/drawing/2014/main" id="{B3DD5A08-69FF-804C-98A0-C16E81C6B3BD}"/>
+                <a16:creationId xmlns:a16="http://schemas.microsoft.com/office/drawing/2014/main" id="{338CE771-F8FD-453A-AC5E-1D9E43184D74}"/>
               </a:ext>
             </a:extLst>
           </p:cNvPr>
@@ -4425,7 +4475,7 @@
     </p:spTree>
     <p:extLst>
       <p:ext uri="{BB962C8B-B14F-4D97-AF65-F5344CB8AC3E}">
-        <p14:creationId xmlns:p14="http://schemas.microsoft.com/office/powerpoint/2010/main" val="1626972229"/>
+        <p14:creationId xmlns:p14="http://schemas.microsoft.com/office/powerpoint/2010/main" val="131765341"/>
       </p:ext>
     </p:extLst>
   </p:cSld>
@@ -4462,43 +4512,68 @@
             <p:ph type="title"/>
           </p:nvPr>
         </p:nvSpPr>
-        <p:spPr>
-          <a:xfrm>
-            <a:off x="628650" y="304271"/>
-            <a:ext cx="7886700" cy="4838370"/>
-          </a:xfrm>
-        </p:spPr>
-        <p:txBody>
-          <a:bodyPr>
-            <a:normAutofit/>
-          </a:bodyPr>
-          <a:lstStyle/>
-          <a:p>
-            <a:pPr algn="ctr"/>
-            <a:r>
-              <a:rPr lang="en-US" sz="7200" b="1" dirty="0">
-                <a:latin typeface="Helvetica" pitchFamily="2" charset="0"/>
-              </a:rPr>
-              <a:t>Thank </a:t>
-            </a:r>
-            <a:r>
-              <a:rPr lang="en-US" sz="7200" b="1">
-                <a:latin typeface="Helvetica" pitchFamily="2" charset="0"/>
-              </a:rPr>
-              <a:t>you!</a:t>
-            </a:r>
-            <a:endParaRPr lang="en-US" sz="7200" b="1" dirty="0">
+        <p:spPr/>
+        <p:txBody>
+          <a:bodyPr/>
+          <a:lstStyle/>
+          <a:p>
+            <a:r>
+              <a:rPr lang="en-ZA" dirty="0">
+                <a:latin typeface="Helvetica" panose="020B0604020202020204" pitchFamily="34" charset="0"/>
+                <a:cs typeface="Helvetica" panose="020B0604020202020204" pitchFamily="34" charset="0"/>
+              </a:rPr>
+              <a:t>Vaishnavi Process Model</a:t>
+            </a:r>
+            <a:endParaRPr lang="en-US" dirty="0">
+              <a:latin typeface="Helvetica" panose="020B0604020202020204" pitchFamily="34" charset="0"/>
+              <a:cs typeface="Helvetica" panose="020B0604020202020204" pitchFamily="34" charset="0"/>
+            </a:endParaRPr>
+          </a:p>
+        </p:txBody>
+      </p:sp>
+      <p:sp>
+        <p:nvSpPr>
+          <p:cNvPr id="3" name="Content Placeholder 2"/>
+          <p:cNvSpPr>
+            <a:spLocks noGrp="1"/>
+          </p:cNvSpPr>
+          <p:nvPr>
+            <p:ph idx="1"/>
+          </p:nvPr>
+        </p:nvSpPr>
+        <p:spPr>
+          <a:xfrm>
+            <a:off x="628650" y="1354412"/>
+            <a:ext cx="8149590" cy="3793057"/>
+          </a:xfrm>
+        </p:spPr>
+        <p:txBody>
+          <a:bodyPr/>
+          <a:lstStyle/>
+          <a:p>
+            <a:pPr marL="342900" lvl="1" indent="0">
+              <a:buNone/>
+            </a:pPr>
+            <a:endParaRPr lang="en-US" dirty="0">
               <a:latin typeface="Helvetica" pitchFamily="2" charset="0"/>
             </a:endParaRPr>
           </a:p>
-        </p:txBody>
-      </p:sp>
-      <p:sp>
-        <p:nvSpPr>
-          <p:cNvPr id="3" name="TextBox 2">
+          <a:p>
+            <a:pPr marL="342900" lvl="1" indent="0">
+              <a:buNone/>
+            </a:pPr>
+            <a:endParaRPr lang="en-US" dirty="0">
+              <a:latin typeface="Helvetica" pitchFamily="2" charset="0"/>
+            </a:endParaRPr>
+          </a:p>
+        </p:txBody>
+      </p:sp>
+      <p:sp>
+        <p:nvSpPr>
+          <p:cNvPr id="5" name="TextBox 4">
             <a:extLst>
               <a:ext uri="{FF2B5EF4-FFF2-40B4-BE49-F238E27FC236}">
-                <a16:creationId xmlns:a16="http://schemas.microsoft.com/office/drawing/2014/main" id="{338CE771-F8FD-453A-AC5E-1D9E43184D74}"/>
+                <a16:creationId xmlns:a16="http://schemas.microsoft.com/office/drawing/2014/main" id="{B3DD5A08-69FF-804C-98A0-C16E81C6B3BD}"/>
               </a:ext>
             </a:extLst>
           </p:cNvPr>
@@ -4532,10 +4607,609 @@
           </a:p>
         </p:txBody>
       </p:sp>
+      <p:pic>
+        <p:nvPicPr>
+          <p:cNvPr id="6" name="Picture 5" descr="Diagram&#10;&#10;Description automatically generated">
+            <a:extLst>
+              <a:ext uri="{FF2B5EF4-FFF2-40B4-BE49-F238E27FC236}">
+                <a16:creationId xmlns:a16="http://schemas.microsoft.com/office/drawing/2014/main" id="{91D15AF8-5A1F-4DE5-8A01-5FF4D39B5C49}"/>
+              </a:ext>
+            </a:extLst>
+          </p:cNvPr>
+          <p:cNvPicPr>
+            <a:picLocks noChangeAspect="1"/>
+          </p:cNvPicPr>
+          <p:nvPr/>
+        </p:nvPicPr>
+        <p:blipFill>
+          <a:blip r:embed="rId2"/>
+          <a:stretch>
+            <a:fillRect/>
+          </a:stretch>
+        </p:blipFill>
+        <p:spPr>
+          <a:xfrm>
+            <a:off x="413751" y="1749986"/>
+            <a:ext cx="4158249" cy="2814580"/>
+          </a:xfrm>
+          <a:prstGeom prst="rect">
+            <a:avLst/>
+          </a:prstGeom>
+        </p:spPr>
+      </p:pic>
+      <p:sp>
+        <p:nvSpPr>
+          <p:cNvPr id="8" name="TextBox 7">
+            <a:extLst>
+              <a:ext uri="{FF2B5EF4-FFF2-40B4-BE49-F238E27FC236}">
+                <a16:creationId xmlns:a16="http://schemas.microsoft.com/office/drawing/2014/main" id="{14F21577-D48B-4225-8D96-5B88A5C39646}"/>
+              </a:ext>
+            </a:extLst>
+          </p:cNvPr>
+          <p:cNvSpPr txBox="1"/>
+          <p:nvPr/>
+        </p:nvSpPr>
+        <p:spPr>
+          <a:xfrm>
+            <a:off x="5150021" y="1274389"/>
+            <a:ext cx="3365329" cy="3765774"/>
+          </a:xfrm>
+          <a:prstGeom prst="rect">
+            <a:avLst/>
+          </a:prstGeom>
+          <a:noFill/>
+        </p:spPr>
+        <p:txBody>
+          <a:bodyPr wrap="square">
+            <a:spAutoFit/>
+          </a:bodyPr>
+          <a:lstStyle/>
+          <a:p>
+            <a:r>
+              <a:rPr lang="en-US" dirty="0"/>
+              <a:t>Process Steps:</a:t>
+            </a:r>
+          </a:p>
+          <a:p>
+            <a:endParaRPr lang="en-US" dirty="0"/>
+          </a:p>
+          <a:p>
+            <a:pPr marL="342900" indent="-342900">
+              <a:buFont typeface="+mj-lt"/>
+              <a:buAutoNum type="arabicPeriod"/>
+            </a:pPr>
+            <a:r>
+              <a:rPr lang="en-US" dirty="0"/>
+              <a:t>Awareness of problem: The objective is to improve the communication between project managers and project developers (Chapter 1 + 2 + 3)</a:t>
+            </a:r>
+          </a:p>
+          <a:p>
+            <a:pPr marL="342900" indent="-342900">
+              <a:buFont typeface="+mj-lt"/>
+              <a:buAutoNum type="arabicPeriod"/>
+            </a:pPr>
+            <a:endParaRPr lang="en-US" dirty="0"/>
+          </a:p>
+          <a:p>
+            <a:pPr marL="342900" indent="-342900">
+              <a:buFont typeface="+mj-lt"/>
+              <a:buAutoNum type="arabicPeriod"/>
+            </a:pPr>
+            <a:r>
+              <a:rPr lang="en-US" dirty="0"/>
+              <a:t>Suggestion: The interview (Chapter 4)</a:t>
+            </a:r>
+          </a:p>
+          <a:p>
+            <a:pPr marL="342900" indent="-342900">
+              <a:buFont typeface="+mj-lt"/>
+              <a:buAutoNum type="arabicPeriod"/>
+            </a:pPr>
+            <a:endParaRPr lang="en-US" dirty="0"/>
+          </a:p>
+          <a:p>
+            <a:pPr marL="342900" indent="-342900">
+              <a:buFont typeface="+mj-lt"/>
+              <a:buAutoNum type="arabicPeriod"/>
+            </a:pPr>
+            <a:r>
+              <a:rPr lang="en-US" dirty="0"/>
+              <a:t>Development: The actual development (Chapter 5)</a:t>
+            </a:r>
+          </a:p>
+          <a:p>
+            <a:pPr marL="342900" indent="-342900">
+              <a:buFont typeface="+mj-lt"/>
+              <a:buAutoNum type="arabicPeriod"/>
+            </a:pPr>
+            <a:endParaRPr lang="en-US" dirty="0"/>
+          </a:p>
+          <a:p>
+            <a:pPr marL="342900" indent="-342900">
+              <a:buFont typeface="+mj-lt"/>
+              <a:buAutoNum type="arabicPeriod"/>
+            </a:pPr>
+            <a:r>
+              <a:rPr lang="en-US" dirty="0"/>
+              <a:t>Evaluation: Did it adapt to the industry, is everyone happy? (project demo)</a:t>
+            </a:r>
+          </a:p>
+          <a:p>
+            <a:pPr marL="342900" indent="-342900">
+              <a:buFont typeface="+mj-lt"/>
+              <a:buAutoNum type="arabicPeriod"/>
+            </a:pPr>
+            <a:endParaRPr lang="en-US" dirty="0"/>
+          </a:p>
+          <a:p>
+            <a:pPr marL="342900" indent="-342900">
+              <a:buFont typeface="+mj-lt"/>
+              <a:buAutoNum type="arabicPeriod"/>
+            </a:pPr>
+            <a:r>
+              <a:rPr lang="en-US" dirty="0"/>
+              <a:t>Conclusion: Did it meet the requirements? (Chapter 6)</a:t>
+            </a:r>
+            <a:endParaRPr lang="en-ZA" dirty="0"/>
+          </a:p>
+        </p:txBody>
+      </p:sp>
     </p:spTree>
     <p:extLst>
       <p:ext uri="{BB962C8B-B14F-4D97-AF65-F5344CB8AC3E}">
-        <p14:creationId xmlns:p14="http://schemas.microsoft.com/office/powerpoint/2010/main" val="131765341"/>
+        <p14:creationId xmlns:p14="http://schemas.microsoft.com/office/powerpoint/2010/main" val="1676217799"/>
+      </p:ext>
+    </p:extLst>
+  </p:cSld>
+  <p:clrMapOvr>
+    <a:masterClrMapping/>
+  </p:clrMapOvr>
+</p:sld>
+</file>
+
+<file path=ppt/slides/slide18.xml><?xml version="1.0" encoding="utf-8"?>
+<p:sld xmlns:a="http://schemas.openxmlformats.org/drawingml/2006/main" xmlns:r="http://schemas.openxmlformats.org/officeDocument/2006/relationships" xmlns:p="http://schemas.openxmlformats.org/presentationml/2006/main">
+  <p:cSld>
+    <p:spTree>
+      <p:nvGrpSpPr>
+        <p:cNvPr id="1" name=""/>
+        <p:cNvGrpSpPr/>
+        <p:nvPr/>
+      </p:nvGrpSpPr>
+      <p:grpSpPr>
+        <a:xfrm>
+          <a:off x="0" y="0"/>
+          <a:ext cx="0" cy="0"/>
+          <a:chOff x="0" y="0"/>
+          <a:chExt cx="0" cy="0"/>
+        </a:xfrm>
+      </p:grpSpPr>
+      <p:sp>
+        <p:nvSpPr>
+          <p:cNvPr id="2" name="Title 1"/>
+          <p:cNvSpPr>
+            <a:spLocks noGrp="1"/>
+          </p:cNvSpPr>
+          <p:nvPr>
+            <p:ph type="title"/>
+          </p:nvPr>
+        </p:nvSpPr>
+        <p:spPr/>
+        <p:txBody>
+          <a:bodyPr/>
+          <a:lstStyle/>
+          <a:p>
+            <a:r>
+              <a:rPr lang="en-US" dirty="0">
+                <a:latin typeface="Helvetica" panose="020B0604020202020204" pitchFamily="34" charset="0"/>
+                <a:cs typeface="Helvetica" panose="020B0604020202020204" pitchFamily="34" charset="0"/>
+              </a:rPr>
+              <a:t>Features:</a:t>
+            </a:r>
+          </a:p>
+        </p:txBody>
+      </p:sp>
+      <p:sp>
+        <p:nvSpPr>
+          <p:cNvPr id="3" name="Content Placeholder 2"/>
+          <p:cNvSpPr>
+            <a:spLocks noGrp="1"/>
+          </p:cNvSpPr>
+          <p:nvPr>
+            <p:ph idx="1"/>
+          </p:nvPr>
+        </p:nvSpPr>
+        <p:spPr>
+          <a:xfrm>
+            <a:off x="628650" y="1354412"/>
+            <a:ext cx="8149590" cy="3793057"/>
+          </a:xfrm>
+        </p:spPr>
+        <p:txBody>
+          <a:bodyPr/>
+          <a:lstStyle/>
+          <a:p>
+            <a:pPr marL="342900" lvl="1" indent="0">
+              <a:buNone/>
+            </a:pPr>
+            <a:endParaRPr lang="en-US" dirty="0">
+              <a:latin typeface="Helvetica" pitchFamily="2" charset="0"/>
+            </a:endParaRPr>
+          </a:p>
+          <a:p>
+            <a:pPr marL="685800" lvl="1" indent="-342900">
+              <a:buFont typeface="+mj-lt"/>
+              <a:buAutoNum type="arabicPeriod"/>
+            </a:pPr>
+            <a:r>
+              <a:rPr lang="en-US" dirty="0">
+                <a:latin typeface="Helvetica" pitchFamily="2" charset="0"/>
+              </a:rPr>
+              <a:t>Analytics Page</a:t>
+            </a:r>
+          </a:p>
+          <a:p>
+            <a:pPr marL="685800" lvl="1" indent="-342900">
+              <a:buFont typeface="+mj-lt"/>
+              <a:buAutoNum type="arabicPeriod"/>
+            </a:pPr>
+            <a:r>
+              <a:rPr lang="en-US" dirty="0">
+                <a:latin typeface="Helvetica" pitchFamily="2" charset="0"/>
+              </a:rPr>
+              <a:t>Chat</a:t>
+            </a:r>
+          </a:p>
+          <a:p>
+            <a:pPr marL="685800" lvl="1" indent="-342900">
+              <a:buFont typeface="+mj-lt"/>
+              <a:buAutoNum type="arabicPeriod"/>
+            </a:pPr>
+            <a:r>
+              <a:rPr lang="en-US" dirty="0">
+                <a:latin typeface="Helvetica" pitchFamily="2" charset="0"/>
+              </a:rPr>
+              <a:t>Calendar</a:t>
+            </a:r>
+          </a:p>
+          <a:p>
+            <a:pPr marL="685800" lvl="1" indent="-342900">
+              <a:buFont typeface="+mj-lt"/>
+              <a:buAutoNum type="arabicPeriod"/>
+            </a:pPr>
+            <a:r>
+              <a:rPr lang="en-US" dirty="0">
+                <a:latin typeface="Helvetica" pitchFamily="2" charset="0"/>
+              </a:rPr>
+              <a:t>To Do</a:t>
+            </a:r>
+          </a:p>
+          <a:p>
+            <a:pPr marL="685800" lvl="1" indent="-342900">
+              <a:buFont typeface="+mj-lt"/>
+              <a:buAutoNum type="arabicPeriod"/>
+            </a:pPr>
+            <a:r>
+              <a:rPr lang="en-US" dirty="0">
+                <a:latin typeface="Helvetica" pitchFamily="2" charset="0"/>
+              </a:rPr>
+              <a:t>My Team</a:t>
+            </a:r>
+          </a:p>
+          <a:p>
+            <a:pPr marL="685800" lvl="1" indent="-342900">
+              <a:buFont typeface="+mj-lt"/>
+              <a:buAutoNum type="arabicPeriod"/>
+            </a:pPr>
+            <a:r>
+              <a:rPr lang="en-US" dirty="0">
+                <a:latin typeface="Helvetica" pitchFamily="2" charset="0"/>
+              </a:rPr>
+              <a:t>Activities</a:t>
+            </a:r>
+          </a:p>
+        </p:txBody>
+      </p:sp>
+      <p:sp>
+        <p:nvSpPr>
+          <p:cNvPr id="5" name="TextBox 4">
+            <a:extLst>
+              <a:ext uri="{FF2B5EF4-FFF2-40B4-BE49-F238E27FC236}">
+                <a16:creationId xmlns:a16="http://schemas.microsoft.com/office/drawing/2014/main" id="{B3DD5A08-69FF-804C-98A0-C16E81C6B3BD}"/>
+              </a:ext>
+            </a:extLst>
+          </p:cNvPr>
+          <p:cNvSpPr txBox="1"/>
+          <p:nvPr/>
+        </p:nvSpPr>
+        <p:spPr>
+          <a:xfrm>
+            <a:off x="628650" y="165005"/>
+            <a:ext cx="7886700" cy="261610"/>
+          </a:xfrm>
+          <a:prstGeom prst="rect">
+            <a:avLst/>
+          </a:prstGeom>
+          <a:noFill/>
+        </p:spPr>
+        <p:txBody>
+          <a:bodyPr wrap="square" rtlCol="0">
+            <a:spAutoFit/>
+          </a:bodyPr>
+          <a:lstStyle/>
+          <a:p>
+            <a:pPr algn="ctr"/>
+            <a:r>
+              <a:rPr lang="en-US" sz="1100" dirty="0"/>
+              <a:t>Developing a web application to improve communication at a software company</a:t>
+            </a:r>
+            <a:endParaRPr lang="en-GB" sz="1100" i="1" dirty="0">
+              <a:latin typeface="Helvetica" pitchFamily="2" charset="0"/>
+            </a:endParaRPr>
+          </a:p>
+        </p:txBody>
+      </p:sp>
+    </p:spTree>
+    <p:extLst>
+      <p:ext uri="{BB962C8B-B14F-4D97-AF65-F5344CB8AC3E}">
+        <p14:creationId xmlns:p14="http://schemas.microsoft.com/office/powerpoint/2010/main" val="2181749327"/>
+      </p:ext>
+    </p:extLst>
+  </p:cSld>
+  <p:clrMapOvr>
+    <a:masterClrMapping/>
+  </p:clrMapOvr>
+</p:sld>
+</file>
+
+<file path=ppt/slides/slide19.xml><?xml version="1.0" encoding="utf-8"?>
+<p:sld xmlns:a="http://schemas.openxmlformats.org/drawingml/2006/main" xmlns:r="http://schemas.openxmlformats.org/officeDocument/2006/relationships" xmlns:p="http://schemas.openxmlformats.org/presentationml/2006/main">
+  <p:cSld>
+    <p:spTree>
+      <p:nvGrpSpPr>
+        <p:cNvPr id="1" name=""/>
+        <p:cNvGrpSpPr/>
+        <p:nvPr/>
+      </p:nvGrpSpPr>
+      <p:grpSpPr>
+        <a:xfrm>
+          <a:off x="0" y="0"/>
+          <a:ext cx="0" cy="0"/>
+          <a:chOff x="0" y="0"/>
+          <a:chExt cx="0" cy="0"/>
+        </a:xfrm>
+      </p:grpSpPr>
+      <p:sp>
+        <p:nvSpPr>
+          <p:cNvPr id="2" name="Title 1"/>
+          <p:cNvSpPr>
+            <a:spLocks noGrp="1"/>
+          </p:cNvSpPr>
+          <p:nvPr>
+            <p:ph type="title"/>
+          </p:nvPr>
+        </p:nvSpPr>
+        <p:spPr/>
+        <p:txBody>
+          <a:bodyPr/>
+          <a:lstStyle/>
+          <a:p>
+            <a:r>
+              <a:rPr lang="en-US" dirty="0">
+                <a:latin typeface="Helvetica" pitchFamily="2" charset="0"/>
+              </a:rPr>
+              <a:t>What did I use?</a:t>
+            </a:r>
+          </a:p>
+        </p:txBody>
+      </p:sp>
+      <p:sp>
+        <p:nvSpPr>
+          <p:cNvPr id="3" name="Content Placeholder 2"/>
+          <p:cNvSpPr>
+            <a:spLocks noGrp="1"/>
+          </p:cNvSpPr>
+          <p:nvPr>
+            <p:ph idx="1"/>
+          </p:nvPr>
+        </p:nvSpPr>
+        <p:spPr>
+          <a:xfrm>
+            <a:off x="628650" y="1354412"/>
+            <a:ext cx="8149590" cy="3793057"/>
+          </a:xfrm>
+        </p:spPr>
+        <p:txBody>
+          <a:bodyPr/>
+          <a:lstStyle/>
+          <a:p>
+            <a:pPr marL="342900" lvl="1" indent="0">
+              <a:buNone/>
+            </a:pPr>
+            <a:r>
+              <a:rPr lang="en-US" dirty="0">
+                <a:latin typeface="Helvetica" pitchFamily="2" charset="0"/>
+              </a:rPr>
+              <a:t>Hosting on Azure:</a:t>
+            </a:r>
+          </a:p>
+          <a:p>
+            <a:pPr lvl="2"/>
+            <a:r>
+              <a:rPr lang="en-US" dirty="0">
+                <a:latin typeface="Helvetica" pitchFamily="2" charset="0"/>
+              </a:rPr>
+              <a:t>Hosted the Database </a:t>
+            </a:r>
+          </a:p>
+          <a:p>
+            <a:pPr lvl="2"/>
+            <a:r>
+              <a:rPr lang="en-US" dirty="0">
+                <a:latin typeface="Helvetica" pitchFamily="2" charset="0"/>
+              </a:rPr>
+              <a:t>Created my own project (DevOps)</a:t>
+            </a:r>
+          </a:p>
+          <a:p>
+            <a:pPr lvl="2"/>
+            <a:r>
+              <a:rPr lang="en-US" dirty="0">
+                <a:latin typeface="Helvetica" pitchFamily="2" charset="0"/>
+              </a:rPr>
+              <a:t>Hosted my repository</a:t>
+            </a:r>
+          </a:p>
+          <a:p>
+            <a:pPr lvl="2"/>
+            <a:endParaRPr lang="en-US" dirty="0">
+              <a:latin typeface="Helvetica" pitchFamily="2" charset="0"/>
+            </a:endParaRPr>
+          </a:p>
+          <a:p>
+            <a:pPr marL="342900" lvl="1" indent="0">
+              <a:buNone/>
+            </a:pPr>
+            <a:r>
+              <a:rPr lang="en-US" dirty="0">
+                <a:latin typeface="Helvetica" pitchFamily="2" charset="0"/>
+              </a:rPr>
+              <a:t>Languages, programs and frameworks:</a:t>
+            </a:r>
+          </a:p>
+          <a:p>
+            <a:pPr lvl="2"/>
+            <a:r>
+              <a:rPr lang="en-US" dirty="0">
+                <a:latin typeface="Helvetica" pitchFamily="2" charset="0"/>
+              </a:rPr>
+              <a:t>Html</a:t>
+            </a:r>
+          </a:p>
+          <a:p>
+            <a:pPr lvl="2"/>
+            <a:r>
+              <a:rPr lang="en-US" dirty="0" err="1">
+                <a:latin typeface="Helvetica" pitchFamily="2" charset="0"/>
+              </a:rPr>
+              <a:t>Javascript</a:t>
+            </a:r>
+            <a:endParaRPr lang="en-US" dirty="0">
+              <a:latin typeface="Helvetica" pitchFamily="2" charset="0"/>
+            </a:endParaRPr>
+          </a:p>
+          <a:p>
+            <a:pPr lvl="2"/>
+            <a:r>
+              <a:rPr lang="en-US" dirty="0">
+                <a:latin typeface="Helvetica" pitchFamily="2" charset="0"/>
+              </a:rPr>
+              <a:t>Vue (binding framework)</a:t>
+            </a:r>
+          </a:p>
+          <a:p>
+            <a:pPr lvl="2"/>
+            <a:r>
+              <a:rPr lang="en-US" dirty="0">
+                <a:latin typeface="Helvetica" pitchFamily="2" charset="0"/>
+              </a:rPr>
+              <a:t>SCSS</a:t>
+            </a:r>
+          </a:p>
+          <a:p>
+            <a:pPr lvl="2"/>
+            <a:r>
+              <a:rPr lang="en-US" dirty="0" err="1">
+                <a:latin typeface="Helvetica" pitchFamily="2" charset="0"/>
+              </a:rPr>
+              <a:t>.Net</a:t>
+            </a:r>
+            <a:r>
+              <a:rPr lang="en-US" dirty="0">
+                <a:latin typeface="Helvetica" pitchFamily="2" charset="0"/>
+              </a:rPr>
+              <a:t> Core 3.1</a:t>
+            </a:r>
+          </a:p>
+          <a:p>
+            <a:pPr lvl="2"/>
+            <a:r>
+              <a:rPr lang="en-US" dirty="0">
+                <a:latin typeface="Helvetica" pitchFamily="2" charset="0"/>
+              </a:rPr>
+              <a:t>Fork (repository)</a:t>
+            </a:r>
+          </a:p>
+          <a:p>
+            <a:pPr lvl="2"/>
+            <a:r>
+              <a:rPr lang="en-US" dirty="0">
+                <a:latin typeface="Helvetica" pitchFamily="2" charset="0"/>
+              </a:rPr>
+              <a:t>Azure Data studio (DBMS)</a:t>
+            </a:r>
+          </a:p>
+          <a:p>
+            <a:pPr marL="342900" lvl="1" indent="0">
+              <a:buNone/>
+            </a:pPr>
+            <a:endParaRPr lang="en-US" dirty="0">
+              <a:latin typeface="Helvetica" pitchFamily="2" charset="0"/>
+            </a:endParaRPr>
+          </a:p>
+          <a:p>
+            <a:pPr marL="342900" lvl="1" indent="0">
+              <a:buNone/>
+            </a:pPr>
+            <a:endParaRPr lang="en-US" dirty="0">
+              <a:latin typeface="Helvetica" pitchFamily="2" charset="0"/>
+            </a:endParaRPr>
+          </a:p>
+        </p:txBody>
+      </p:sp>
+      <p:sp>
+        <p:nvSpPr>
+          <p:cNvPr id="5" name="TextBox 4">
+            <a:extLst>
+              <a:ext uri="{FF2B5EF4-FFF2-40B4-BE49-F238E27FC236}">
+                <a16:creationId xmlns:a16="http://schemas.microsoft.com/office/drawing/2014/main" id="{B3DD5A08-69FF-804C-98A0-C16E81C6B3BD}"/>
+              </a:ext>
+            </a:extLst>
+          </p:cNvPr>
+          <p:cNvSpPr txBox="1"/>
+          <p:nvPr/>
+        </p:nvSpPr>
+        <p:spPr>
+          <a:xfrm>
+            <a:off x="628650" y="165005"/>
+            <a:ext cx="7886700" cy="261610"/>
+          </a:xfrm>
+          <a:prstGeom prst="rect">
+            <a:avLst/>
+          </a:prstGeom>
+          <a:noFill/>
+        </p:spPr>
+        <p:txBody>
+          <a:bodyPr wrap="square" rtlCol="0">
+            <a:spAutoFit/>
+          </a:bodyPr>
+          <a:lstStyle/>
+          <a:p>
+            <a:pPr algn="ctr"/>
+            <a:r>
+              <a:rPr lang="en-US" sz="1100" dirty="0"/>
+              <a:t>Developing a web application to improve communication at a software company</a:t>
+            </a:r>
+            <a:endParaRPr lang="en-GB" sz="1100" i="1" dirty="0">
+              <a:latin typeface="Helvetica" pitchFamily="2" charset="0"/>
+            </a:endParaRPr>
+          </a:p>
+        </p:txBody>
+      </p:sp>
+    </p:spTree>
+    <p:extLst>
+      <p:ext uri="{BB962C8B-B14F-4D97-AF65-F5344CB8AC3E}">
+        <p14:creationId xmlns:p14="http://schemas.microsoft.com/office/powerpoint/2010/main" val="501050002"/>
       </p:ext>
     </p:extLst>
   </p:cSld>
@@ -4692,6 +5366,172 @@
     <p:extLst>
       <p:ext uri="{BB962C8B-B14F-4D97-AF65-F5344CB8AC3E}">
         <p14:creationId xmlns:p14="http://schemas.microsoft.com/office/powerpoint/2010/main" val="1596851299"/>
+      </p:ext>
+    </p:extLst>
+  </p:cSld>
+  <p:clrMapOvr>
+    <a:masterClrMapping/>
+  </p:clrMapOvr>
+</p:sld>
+</file>
+
+<file path=ppt/slides/slide20.xml><?xml version="1.0" encoding="utf-8"?>
+<p:sld xmlns:a="http://schemas.openxmlformats.org/drawingml/2006/main" xmlns:r="http://schemas.openxmlformats.org/officeDocument/2006/relationships" xmlns:p="http://schemas.openxmlformats.org/presentationml/2006/main">
+  <p:cSld>
+    <p:spTree>
+      <p:nvGrpSpPr>
+        <p:cNvPr id="1" name=""/>
+        <p:cNvGrpSpPr/>
+        <p:nvPr/>
+      </p:nvGrpSpPr>
+      <p:grpSpPr>
+        <a:xfrm>
+          <a:off x="0" y="0"/>
+          <a:ext cx="0" cy="0"/>
+          <a:chOff x="0" y="0"/>
+          <a:chExt cx="0" cy="0"/>
+        </a:xfrm>
+      </p:grpSpPr>
+      <p:sp>
+        <p:nvSpPr>
+          <p:cNvPr id="2" name="Title 1"/>
+          <p:cNvSpPr>
+            <a:spLocks noGrp="1"/>
+          </p:cNvSpPr>
+          <p:nvPr>
+            <p:ph type="title"/>
+          </p:nvPr>
+        </p:nvSpPr>
+        <p:spPr>
+          <a:xfrm>
+            <a:off x="567105" y="296198"/>
+            <a:ext cx="7886700" cy="1104636"/>
+          </a:xfrm>
+        </p:spPr>
+        <p:txBody>
+          <a:bodyPr/>
+          <a:lstStyle/>
+          <a:p>
+            <a:pPr algn="ctr"/>
+            <a:r>
+              <a:rPr lang="en-US" dirty="0">
+                <a:latin typeface="Helvetica" pitchFamily="2" charset="0"/>
+              </a:rPr>
+              <a:t>Let's get to it!</a:t>
+            </a:r>
+          </a:p>
+        </p:txBody>
+      </p:sp>
+      <p:sp>
+        <p:nvSpPr>
+          <p:cNvPr id="3" name="Content Placeholder 2"/>
+          <p:cNvSpPr>
+            <a:spLocks noGrp="1"/>
+          </p:cNvSpPr>
+          <p:nvPr>
+            <p:ph idx="1"/>
+          </p:nvPr>
+        </p:nvSpPr>
+        <p:spPr>
+          <a:xfrm>
+            <a:off x="628650" y="1354412"/>
+            <a:ext cx="8149590" cy="3793057"/>
+          </a:xfrm>
+        </p:spPr>
+        <p:txBody>
+          <a:bodyPr/>
+          <a:lstStyle/>
+          <a:p>
+            <a:pPr marL="342900" lvl="1" indent="0">
+              <a:buNone/>
+            </a:pPr>
+            <a:endParaRPr lang="en-US" dirty="0">
+              <a:latin typeface="Helvetica" pitchFamily="2" charset="0"/>
+            </a:endParaRPr>
+          </a:p>
+          <a:p>
+            <a:pPr marL="342900" lvl="1" indent="0">
+              <a:buNone/>
+            </a:pPr>
+            <a:endParaRPr lang="en-US" dirty="0">
+              <a:latin typeface="Helvetica" pitchFamily="2" charset="0"/>
+            </a:endParaRPr>
+          </a:p>
+        </p:txBody>
+      </p:sp>
+      <p:sp>
+        <p:nvSpPr>
+          <p:cNvPr id="5" name="TextBox 4">
+            <a:extLst>
+              <a:ext uri="{FF2B5EF4-FFF2-40B4-BE49-F238E27FC236}">
+                <a16:creationId xmlns:a16="http://schemas.microsoft.com/office/drawing/2014/main" id="{B3DD5A08-69FF-804C-98A0-C16E81C6B3BD}"/>
+              </a:ext>
+            </a:extLst>
+          </p:cNvPr>
+          <p:cNvSpPr txBox="1"/>
+          <p:nvPr/>
+        </p:nvSpPr>
+        <p:spPr>
+          <a:xfrm>
+            <a:off x="628650" y="165005"/>
+            <a:ext cx="7886700" cy="261610"/>
+          </a:xfrm>
+          <a:prstGeom prst="rect">
+            <a:avLst/>
+          </a:prstGeom>
+          <a:noFill/>
+        </p:spPr>
+        <p:txBody>
+          <a:bodyPr wrap="square" rtlCol="0">
+            <a:spAutoFit/>
+          </a:bodyPr>
+          <a:lstStyle/>
+          <a:p>
+            <a:pPr algn="ctr"/>
+            <a:r>
+              <a:rPr lang="en-US" sz="1100" dirty="0"/>
+              <a:t>Developing a web application to improve communication at a software company</a:t>
+            </a:r>
+            <a:endParaRPr lang="en-GB" sz="1100" i="1" dirty="0">
+              <a:latin typeface="Helvetica" pitchFamily="2" charset="0"/>
+            </a:endParaRPr>
+          </a:p>
+        </p:txBody>
+      </p:sp>
+      <p:pic>
+        <p:nvPicPr>
+          <p:cNvPr id="6" name="Picture 5" descr="Logo&#10;&#10;Description automatically generated">
+            <a:extLst>
+              <a:ext uri="{FF2B5EF4-FFF2-40B4-BE49-F238E27FC236}">
+                <a16:creationId xmlns:a16="http://schemas.microsoft.com/office/drawing/2014/main" id="{70883F33-C1BB-4485-9476-6AD370B99891}"/>
+              </a:ext>
+            </a:extLst>
+          </p:cNvPr>
+          <p:cNvPicPr>
+            <a:picLocks noChangeAspect="1"/>
+          </p:cNvPicPr>
+          <p:nvPr/>
+        </p:nvPicPr>
+        <p:blipFill>
+          <a:blip r:embed="rId2"/>
+          <a:stretch>
+            <a:fillRect/>
+          </a:stretch>
+        </p:blipFill>
+        <p:spPr>
+          <a:xfrm>
+            <a:off x="2767822" y="1476756"/>
+            <a:ext cx="3485267" cy="3485267"/>
+          </a:xfrm>
+          <a:prstGeom prst="rect">
+            <a:avLst/>
+          </a:prstGeom>
+        </p:spPr>
+      </p:pic>
+    </p:spTree>
+    <p:extLst>
+      <p:ext uri="{BB962C8B-B14F-4D97-AF65-F5344CB8AC3E}">
+        <p14:creationId xmlns:p14="http://schemas.microsoft.com/office/powerpoint/2010/main" val="2662257960"/>
       </p:ext>
     </p:extLst>
   </p:cSld>
@@ -4935,7 +5775,7 @@
               <a:rPr lang="en-US" dirty="0">
                 <a:latin typeface="Helvetica" pitchFamily="2" charset="0"/>
               </a:rPr>
-              <a:t>This study proposes to develop an artifact that will allow project managers and project developers to have access to a way of communicating and to access important information during the day with ease.</a:t>
+              <a:t>This study proposes to develop an artifact that will allow project managers and project developers to have access to a way of communicating, and to access important information during the day with ease.</a:t>
             </a:r>
           </a:p>
         </p:txBody>
@@ -5372,7 +6212,14 @@
               <a:rPr lang="en-US" dirty="0">
                 <a:latin typeface="Helvetica" pitchFamily="2" charset="0"/>
               </a:rPr>
-              <a:t>A Design Science Research paradigm is used.</a:t>
+              <a:t>A Design Science Research paradigm is used. An artefact was used to </a:t>
+            </a:r>
+            <a:r>
+              <a:rPr lang="en-US" dirty="0">
+                <a:latin typeface="Helvetica" panose="020B0604020202020204" pitchFamily="34" charset="0"/>
+                <a:cs typeface="Helvetica" panose="020B0604020202020204" pitchFamily="34" charset="0"/>
+              </a:rPr>
+              <a:t>achieve the aims and objectives.</a:t>
             </a:r>
           </a:p>
           <a:p>
@@ -5707,6 +6554,9 @@
             </a:r>
           </a:p>
           <a:p>
+            <a:pPr marL="0" indent="0">
+              <a:buNone/>
+            </a:pPr>
             <a:endParaRPr lang="en-US" dirty="0">
               <a:latin typeface="Helvetica" pitchFamily="2" charset="0"/>
             </a:endParaRPr>
@@ -5716,20 +6566,7 @@
               <a:rPr lang="en-US" dirty="0">
                 <a:latin typeface="Helvetica" pitchFamily="2" charset="0"/>
               </a:rPr>
-              <a:t>Anonymity</a:t>
-            </a:r>
-          </a:p>
-          <a:p>
-            <a:endParaRPr lang="en-US" dirty="0">
-              <a:latin typeface="Helvetica" pitchFamily="2" charset="0"/>
-            </a:endParaRPr>
-          </a:p>
-          <a:p>
-            <a:r>
-              <a:rPr lang="en-US" dirty="0">
-                <a:latin typeface="Helvetica" pitchFamily="2" charset="0"/>
-              </a:rPr>
-              <a:t>Confidentiality</a:t>
+              <a:t>Confidential</a:t>
             </a:r>
           </a:p>
           <a:p>

</xml_diff>